<commit_message>
Done with app. Working on presentation
</commit_message>
<xml_diff>
--- a/Emotion Tracker App Project.pptx
+++ b/Emotion Tracker App Project.pptx
@@ -5,27 +5,29 @@
     <p:sldMasterId id="2147483648" r:id="rId4"/>
   </p:sldMasterIdLst>
   <p:notesMasterIdLst>
-    <p:notesMasterId r:id="rId20"/>
+    <p:notesMasterId r:id="rId22"/>
   </p:notesMasterIdLst>
   <p:handoutMasterIdLst>
-    <p:handoutMasterId r:id="rId21"/>
+    <p:handoutMasterId r:id="rId23"/>
   </p:handoutMasterIdLst>
   <p:sldIdLst>
     <p:sldId id="256" r:id="rId5"/>
-    <p:sldId id="257" r:id="rId6"/>
-    <p:sldId id="260" r:id="rId7"/>
-    <p:sldId id="258" r:id="rId8"/>
-    <p:sldId id="286" r:id="rId9"/>
-    <p:sldId id="261" r:id="rId10"/>
-    <p:sldId id="262" r:id="rId11"/>
-    <p:sldId id="283" r:id="rId12"/>
-    <p:sldId id="264" r:id="rId13"/>
-    <p:sldId id="266" r:id="rId14"/>
-    <p:sldId id="284" r:id="rId15"/>
-    <p:sldId id="267" r:id="rId16"/>
-    <p:sldId id="269" r:id="rId17"/>
-    <p:sldId id="268" r:id="rId18"/>
-    <p:sldId id="285" r:id="rId19"/>
+    <p:sldId id="258" r:id="rId6"/>
+    <p:sldId id="286" r:id="rId7"/>
+    <p:sldId id="288" r:id="rId8"/>
+    <p:sldId id="287" r:id="rId9"/>
+    <p:sldId id="257" r:id="rId10"/>
+    <p:sldId id="260" r:id="rId11"/>
+    <p:sldId id="261" r:id="rId12"/>
+    <p:sldId id="262" r:id="rId13"/>
+    <p:sldId id="283" r:id="rId14"/>
+    <p:sldId id="264" r:id="rId15"/>
+    <p:sldId id="266" r:id="rId16"/>
+    <p:sldId id="284" r:id="rId17"/>
+    <p:sldId id="267" r:id="rId18"/>
+    <p:sldId id="269" r:id="rId19"/>
+    <p:sldId id="268" r:id="rId20"/>
+    <p:sldId id="285" r:id="rId21"/>
   </p:sldIdLst>
   <p:sldSz cx="12192000" cy="6858000"/>
   <p:notesSz cx="6858000" cy="9144000"/>
@@ -1151,7 +1153,7 @@
           <a:p>
             <a:fld id="{1CA5457B-CDAE-4DEB-AEC8-C82DE2312E37}" type="datetimeFigureOut">
               <a:rPr lang="en-US" smtClean="0"/>
-              <a:t>3/11/2024</a:t>
+              <a:t>3/21/2024</a:t>
             </a:fld>
             <a:endParaRPr lang="en-US" dirty="0"/>
           </a:p>
@@ -1328,7 +1330,7 @@
           <a:p>
             <a:fld id="{090B78EA-28CE-41D8-9043-90E391E5F567}" type="datetimeFigureOut">
               <a:rPr lang="en-US" noProof="0" smtClean="0"/>
-              <a:t>3/11/2024</a:t>
+              <a:t>3/21/2024</a:t>
             </a:fld>
             <a:endParaRPr lang="en-US" noProof="0" dirty="0"/>
           </a:p>
@@ -26472,6 +26474,389 @@
 </file>
 
 <file path=ppt/slides/slide10.xml><?xml version="1.0" encoding="utf-8"?>
+<p:sld xmlns:a="http://schemas.openxmlformats.org/drawingml/2006/main" xmlns:r="http://schemas.openxmlformats.org/officeDocument/2006/relationships" xmlns:p="http://schemas.openxmlformats.org/presentationml/2006/main">
+  <p:cSld>
+    <p:spTree>
+      <p:nvGrpSpPr>
+        <p:cNvPr id="1" name=""/>
+        <p:cNvGrpSpPr/>
+        <p:nvPr/>
+      </p:nvGrpSpPr>
+      <p:grpSpPr>
+        <a:xfrm>
+          <a:off x="0" y="0"/>
+          <a:ext cx="0" cy="0"/>
+          <a:chOff x="0" y="0"/>
+          <a:chExt cx="0" cy="0"/>
+        </a:xfrm>
+      </p:grpSpPr>
+      <p:sp>
+        <p:nvSpPr>
+          <p:cNvPr id="4" name="Title 3">
+            <a:extLst>
+              <a:ext uri="{FF2B5EF4-FFF2-40B4-BE49-F238E27FC236}">
+                <a16:creationId xmlns:a16="http://schemas.microsoft.com/office/drawing/2014/main" id="{315E3981-F0D7-482C-A8E0-6A57700BECA7}"/>
+              </a:ext>
+            </a:extLst>
+          </p:cNvPr>
+          <p:cNvSpPr>
+            <a:spLocks noGrp="1"/>
+          </p:cNvSpPr>
+          <p:nvPr>
+            <p:ph type="title"/>
+          </p:nvPr>
+        </p:nvSpPr>
+        <p:spPr/>
+        <p:txBody>
+          <a:bodyPr/>
+          <a:lstStyle/>
+          <a:p>
+            <a:r>
+              <a:rPr lang="en-US" dirty="0"/>
+              <a:t>Content Title 03</a:t>
+            </a:r>
+          </a:p>
+        </p:txBody>
+      </p:sp>
+      <p:pic>
+        <p:nvPicPr>
+          <p:cNvPr id="20" name="Picture Placeholder 19" descr="Triangular pattern design with dimension">
+            <a:extLst>
+              <a:ext uri="{FF2B5EF4-FFF2-40B4-BE49-F238E27FC236}">
+                <a16:creationId xmlns:a16="http://schemas.microsoft.com/office/drawing/2014/main" id="{3DCA2B8E-64D3-7645-8DEB-688ED5756F52}"/>
+              </a:ext>
+            </a:extLst>
+          </p:cNvPr>
+          <p:cNvPicPr>
+            <a:picLocks noGrp="1" noChangeAspect="1"/>
+          </p:cNvPicPr>
+          <p:nvPr>
+            <p:ph type="pic" sz="quarter" idx="19"/>
+          </p:nvPr>
+        </p:nvPicPr>
+        <p:blipFill>
+          <a:blip r:embed="rId2">
+            <a:extLst>
+              <a:ext uri="{28A0092B-C50C-407E-A947-70E740481C1C}">
+                <a14:useLocalDpi xmlns:a14="http://schemas.microsoft.com/office/drawing/2010/main" val="0"/>
+              </a:ext>
+            </a:extLst>
+          </a:blip>
+          <a:srcRect/>
+          <a:stretch>
+            <a:fillRect/>
+          </a:stretch>
+        </p:blipFill>
+        <p:spPr/>
+      </p:pic>
+      <p:sp>
+        <p:nvSpPr>
+          <p:cNvPr id="19" name="Text Placeholder 18">
+            <a:extLst>
+              <a:ext uri="{FF2B5EF4-FFF2-40B4-BE49-F238E27FC236}">
+                <a16:creationId xmlns:a16="http://schemas.microsoft.com/office/drawing/2014/main" id="{782206B1-586F-4254-9B36-D06C4E294ACF}"/>
+              </a:ext>
+            </a:extLst>
+          </p:cNvPr>
+          <p:cNvSpPr>
+            <a:spLocks noGrp="1"/>
+          </p:cNvSpPr>
+          <p:nvPr>
+            <p:ph type="body" sz="quarter" idx="18"/>
+          </p:nvPr>
+        </p:nvSpPr>
+        <p:spPr/>
+        <p:txBody>
+          <a:bodyPr/>
+          <a:lstStyle/>
+          <a:p>
+            <a:r>
+              <a:rPr lang="en-US" dirty="0"/>
+              <a:t>Caption01 appears here</a:t>
+            </a:r>
+          </a:p>
+        </p:txBody>
+      </p:sp>
+      <p:sp>
+        <p:nvSpPr>
+          <p:cNvPr id="21" name="Text Placeholder 20">
+            <a:extLst>
+              <a:ext uri="{FF2B5EF4-FFF2-40B4-BE49-F238E27FC236}">
+                <a16:creationId xmlns:a16="http://schemas.microsoft.com/office/drawing/2014/main" id="{1B8F0371-4F69-4131-91BF-9AB99E6EE89B}"/>
+              </a:ext>
+            </a:extLst>
+          </p:cNvPr>
+          <p:cNvSpPr>
+            <a:spLocks noGrp="1"/>
+          </p:cNvSpPr>
+          <p:nvPr>
+            <p:ph type="body" sz="quarter" idx="20"/>
+          </p:nvPr>
+        </p:nvSpPr>
+        <p:spPr/>
+        <p:txBody>
+          <a:bodyPr/>
+          <a:lstStyle/>
+          <a:p>
+            <a:r>
+              <a:rPr lang="en-US" dirty="0"/>
+              <a:t>Caption03 appears here</a:t>
+            </a:r>
+          </a:p>
+        </p:txBody>
+      </p:sp>
+      <p:sp>
+        <p:nvSpPr>
+          <p:cNvPr id="22" name="Text Placeholder 21">
+            <a:extLst>
+              <a:ext uri="{FF2B5EF4-FFF2-40B4-BE49-F238E27FC236}">
+                <a16:creationId xmlns:a16="http://schemas.microsoft.com/office/drawing/2014/main" id="{78CACAF1-61EA-4605-A8FE-2EEE752B49FF}"/>
+              </a:ext>
+            </a:extLst>
+          </p:cNvPr>
+          <p:cNvSpPr>
+            <a:spLocks noGrp="1"/>
+          </p:cNvSpPr>
+          <p:nvPr>
+            <p:ph type="body" sz="quarter" idx="21"/>
+          </p:nvPr>
+        </p:nvSpPr>
+        <p:spPr/>
+        <p:txBody>
+          <a:bodyPr/>
+          <a:lstStyle/>
+          <a:p>
+            <a:r>
+              <a:rPr lang="en-US" dirty="0"/>
+              <a:t>Caption04 appears here</a:t>
+            </a:r>
+          </a:p>
+        </p:txBody>
+      </p:sp>
+      <p:sp>
+        <p:nvSpPr>
+          <p:cNvPr id="2" name="Slide Number Placeholder 1">
+            <a:extLst>
+              <a:ext uri="{FF2B5EF4-FFF2-40B4-BE49-F238E27FC236}">
+                <a16:creationId xmlns:a16="http://schemas.microsoft.com/office/drawing/2014/main" id="{2F478C69-0A1D-45FF-8600-ED903803FFE1}"/>
+              </a:ext>
+            </a:extLst>
+          </p:cNvPr>
+          <p:cNvSpPr>
+            <a:spLocks noGrp="1"/>
+          </p:cNvSpPr>
+          <p:nvPr>
+            <p:ph type="sldNum" sz="quarter" idx="12"/>
+          </p:nvPr>
+        </p:nvSpPr>
+        <p:spPr/>
+        <p:txBody>
+          <a:bodyPr/>
+          <a:lstStyle/>
+          <a:p>
+            <a:fld id="{C263D6C4-4840-40CC-AC84-17E24B3B7BDE}" type="slidenum">
+              <a:rPr lang="en-US" smtClean="0"/>
+              <a:pPr/>
+              <a:t>10</a:t>
+            </a:fld>
+            <a:endParaRPr lang="en-US" dirty="0"/>
+          </a:p>
+        </p:txBody>
+      </p:sp>
+    </p:spTree>
+    <p:extLst>
+      <p:ext uri="{BB962C8B-B14F-4D97-AF65-F5344CB8AC3E}">
+        <p14:creationId xmlns:p14="http://schemas.microsoft.com/office/powerpoint/2010/main" val="451187730"/>
+      </p:ext>
+    </p:extLst>
+  </p:cSld>
+  <p:clrMapOvr>
+    <a:masterClrMapping/>
+  </p:clrMapOvr>
+  <mc:AlternateContent xmlns:mc="http://schemas.openxmlformats.org/markup-compatibility/2006" xmlns:p14="http://schemas.microsoft.com/office/powerpoint/2010/main">
+    <mc:Choice Requires="p14">
+      <p:transition spd="med" p14:dur="700">
+        <p:fade/>
+      </p:transition>
+    </mc:Choice>
+    <mc:Fallback xmlns="">
+      <p:transition spd="med">
+        <p:fade/>
+      </p:transition>
+    </mc:Fallback>
+  </mc:AlternateContent>
+</p:sld>
+</file>
+
+<file path=ppt/slides/slide11.xml><?xml version="1.0" encoding="utf-8"?>
+<p:sld xmlns:a="http://schemas.openxmlformats.org/drawingml/2006/main" xmlns:r="http://schemas.openxmlformats.org/officeDocument/2006/relationships" xmlns:p="http://schemas.openxmlformats.org/presentationml/2006/main">
+  <p:cSld>
+    <p:spTree>
+      <p:nvGrpSpPr>
+        <p:cNvPr id="1" name=""/>
+        <p:cNvGrpSpPr/>
+        <p:nvPr/>
+      </p:nvGrpSpPr>
+      <p:grpSpPr>
+        <a:xfrm>
+          <a:off x="0" y="0"/>
+          <a:ext cx="0" cy="0"/>
+          <a:chOff x="0" y="0"/>
+          <a:chExt cx="0" cy="0"/>
+        </a:xfrm>
+      </p:grpSpPr>
+      <p:sp>
+        <p:nvSpPr>
+          <p:cNvPr id="4" name="Title 3">
+            <a:extLst>
+              <a:ext uri="{FF2B5EF4-FFF2-40B4-BE49-F238E27FC236}">
+                <a16:creationId xmlns:a16="http://schemas.microsoft.com/office/drawing/2014/main" id="{315E3981-F0D7-482C-A8E0-6A57700BECA7}"/>
+              </a:ext>
+            </a:extLst>
+          </p:cNvPr>
+          <p:cNvSpPr>
+            <a:spLocks noGrp="1"/>
+          </p:cNvSpPr>
+          <p:nvPr>
+            <p:ph type="title"/>
+          </p:nvPr>
+        </p:nvSpPr>
+        <p:spPr/>
+        <p:txBody>
+          <a:bodyPr/>
+          <a:lstStyle/>
+          <a:p>
+            <a:r>
+              <a:rPr lang="en-US" dirty="0"/>
+              <a:t>Content Title 04</a:t>
+            </a:r>
+          </a:p>
+        </p:txBody>
+      </p:sp>
+      <p:pic>
+        <p:nvPicPr>
+          <p:cNvPr id="8" name="Picture Placeholder 7" descr="Triangular pattern design with dimension">
+            <a:extLst>
+              <a:ext uri="{FF2B5EF4-FFF2-40B4-BE49-F238E27FC236}">
+                <a16:creationId xmlns:a16="http://schemas.microsoft.com/office/drawing/2014/main" id="{2301248D-7370-7643-9BE6-F8CDCFF4D460}"/>
+              </a:ext>
+            </a:extLst>
+          </p:cNvPr>
+          <p:cNvPicPr>
+            <a:picLocks noGrp="1" noChangeAspect="1"/>
+          </p:cNvPicPr>
+          <p:nvPr>
+            <p:ph type="pic" sz="quarter" idx="19"/>
+          </p:nvPr>
+        </p:nvPicPr>
+        <p:blipFill rotWithShape="1">
+          <a:blip r:embed="rId2">
+            <a:extLst>
+              <a:ext uri="{28A0092B-C50C-407E-A947-70E740481C1C}">
+                <a14:useLocalDpi xmlns:a14="http://schemas.microsoft.com/office/drawing/2010/main" val="0"/>
+              </a:ext>
+            </a:extLst>
+          </a:blip>
+          <a:srcRect/>
+          <a:stretch/>
+        </p:blipFill>
+        <p:spPr>
+          <a:xfrm>
+            <a:off x="-2" y="1352575"/>
+            <a:ext cx="12192002" cy="2289897"/>
+          </a:xfrm>
+        </p:spPr>
+      </p:pic>
+      <p:sp>
+        <p:nvSpPr>
+          <p:cNvPr id="19" name="Text Placeholder 18">
+            <a:extLst>
+              <a:ext uri="{FF2B5EF4-FFF2-40B4-BE49-F238E27FC236}">
+                <a16:creationId xmlns:a16="http://schemas.microsoft.com/office/drawing/2014/main" id="{782206B1-586F-4254-9B36-D06C4E294ACF}"/>
+              </a:ext>
+            </a:extLst>
+          </p:cNvPr>
+          <p:cNvSpPr>
+            <a:spLocks noGrp="1"/>
+          </p:cNvSpPr>
+          <p:nvPr>
+            <p:ph type="body" sz="quarter" idx="18"/>
+          </p:nvPr>
+        </p:nvSpPr>
+        <p:spPr/>
+        <p:txBody>
+          <a:bodyPr/>
+          <a:lstStyle/>
+          <a:p>
+            <a:r>
+              <a:rPr lang="en-US" dirty="0"/>
+              <a:t>Lorem ipsum dolor sit amet, consectetuer adipiscing elit. Maecenas porttitor congue massa. Fusce posuere, magna sed pulvinar ultricies, purus lectus malesuada libero, sit amet commodo magna eros quis urna. Nunc viverra imperdiet enim. Fusce est. Vivamus a tellus.</a:t>
+            </a:r>
+          </a:p>
+          <a:p>
+            <a:r>
+              <a:rPr lang="en-US" dirty="0"/>
+              <a:t>Pellentesque habitant morbi tristique senectus et netus et malesuada fames ac turpis egestas. Proin pharetra nonummy pede. Mauris et orci.</a:t>
+            </a:r>
+          </a:p>
+        </p:txBody>
+      </p:sp>
+      <p:sp>
+        <p:nvSpPr>
+          <p:cNvPr id="2" name="Slide Number Placeholder 1">
+            <a:extLst>
+              <a:ext uri="{FF2B5EF4-FFF2-40B4-BE49-F238E27FC236}">
+                <a16:creationId xmlns:a16="http://schemas.microsoft.com/office/drawing/2014/main" id="{FAC2D367-2A6E-41FE-A9EA-24FF17BCAA97}"/>
+              </a:ext>
+            </a:extLst>
+          </p:cNvPr>
+          <p:cNvSpPr>
+            <a:spLocks noGrp="1"/>
+          </p:cNvSpPr>
+          <p:nvPr>
+            <p:ph type="sldNum" sz="quarter" idx="12"/>
+          </p:nvPr>
+        </p:nvSpPr>
+        <p:spPr/>
+        <p:txBody>
+          <a:bodyPr/>
+          <a:lstStyle/>
+          <a:p>
+            <a:fld id="{C263D6C4-4840-40CC-AC84-17E24B3B7BDE}" type="slidenum">
+              <a:rPr lang="en-US" smtClean="0"/>
+              <a:pPr/>
+              <a:t>11</a:t>
+            </a:fld>
+            <a:endParaRPr lang="en-US" dirty="0"/>
+          </a:p>
+        </p:txBody>
+      </p:sp>
+    </p:spTree>
+    <p:extLst>
+      <p:ext uri="{BB962C8B-B14F-4D97-AF65-F5344CB8AC3E}">
+        <p14:creationId xmlns:p14="http://schemas.microsoft.com/office/powerpoint/2010/main" val="663103393"/>
+      </p:ext>
+    </p:extLst>
+  </p:cSld>
+  <p:clrMapOvr>
+    <a:masterClrMapping/>
+  </p:clrMapOvr>
+  <mc:AlternateContent xmlns:mc="http://schemas.openxmlformats.org/markup-compatibility/2006" xmlns:p14="http://schemas.microsoft.com/office/powerpoint/2010/main">
+    <mc:Choice Requires="p14">
+      <p:transition spd="med" p14:dur="700">
+        <p:fade/>
+      </p:transition>
+    </mc:Choice>
+    <mc:Fallback xmlns="">
+      <p:transition spd="med">
+        <p:fade/>
+      </p:transition>
+    </mc:Fallback>
+  </mc:AlternateContent>
+</p:sld>
+</file>
+
+<file path=ppt/slides/slide12.xml><?xml version="1.0" encoding="utf-8"?>
 <p:sld xmlns:a="http://schemas.openxmlformats.org/drawingml/2006/main" xmlns:r="http://schemas.openxmlformats.org/officeDocument/2006/relationships" xmlns:p="http://schemas.openxmlformats.org/presentationml/2006/main">
   <p:cSld>
     <p:spTree>
@@ -28361,7 +28746,7 @@
             <a:fld id="{C263D6C4-4840-40CC-AC84-17E24B3B7BDE}" type="slidenum">
               <a:rPr lang="en-US" smtClean="0"/>
               <a:pPr/>
-              <a:t>10</a:t>
+              <a:t>12</a:t>
             </a:fld>
             <a:endParaRPr lang="en-US" dirty="0"/>
           </a:p>
@@ -28392,7 +28777,7 @@
 </p:sld>
 </file>
 
-<file path=ppt/slides/slide11.xml><?xml version="1.0" encoding="utf-8"?>
+<file path=ppt/slides/slide13.xml><?xml version="1.0" encoding="utf-8"?>
 <p:sld xmlns:a="http://schemas.openxmlformats.org/drawingml/2006/main" xmlns:r="http://schemas.openxmlformats.org/officeDocument/2006/relationships" xmlns:p="http://schemas.openxmlformats.org/presentationml/2006/main">
   <p:cSld>
     <p:spTree>
@@ -28489,7 +28874,7 @@
             <a:fld id="{C263D6C4-4840-40CC-AC84-17E24B3B7BDE}" type="slidenum">
               <a:rPr lang="en-US" smtClean="0"/>
               <a:pPr/>
-              <a:t>11</a:t>
+              <a:t>13</a:t>
             </a:fld>
             <a:endParaRPr lang="en-US" dirty="0"/>
           </a:p>
@@ -28520,7 +28905,7 @@
 </p:sld>
 </file>
 
-<file path=ppt/slides/slide12.xml><?xml version="1.0" encoding="utf-8"?>
+<file path=ppt/slides/slide14.xml><?xml version="1.0" encoding="utf-8"?>
 <p:sld xmlns:a="http://schemas.openxmlformats.org/drawingml/2006/main" xmlns:r="http://schemas.openxmlformats.org/officeDocument/2006/relationships" xmlns:p="http://schemas.openxmlformats.org/presentationml/2006/main">
   <p:cSld>
     <p:spTree>
@@ -28609,7 +28994,7 @@
             <a:fld id="{C263D6C4-4840-40CC-AC84-17E24B3B7BDE}" type="slidenum">
               <a:rPr lang="en-US" smtClean="0"/>
               <a:pPr/>
-              <a:t>12</a:t>
+              <a:t>14</a:t>
             </a:fld>
             <a:endParaRPr lang="en-US" dirty="0"/>
           </a:p>
@@ -28640,7 +29025,7 @@
 </p:sld>
 </file>
 
-<file path=ppt/slides/slide13.xml><?xml version="1.0" encoding="utf-8"?>
+<file path=ppt/slides/slide15.xml><?xml version="1.0" encoding="utf-8"?>
 <p:sld xmlns:a="http://schemas.openxmlformats.org/drawingml/2006/main" xmlns:r="http://schemas.openxmlformats.org/officeDocument/2006/relationships" xmlns:p="http://schemas.openxmlformats.org/presentationml/2006/main">
   <p:cSld>
     <p:spTree>
@@ -28702,7 +29087,7 @@
 </p:sld>
 </file>
 
-<file path=ppt/slides/slide14.xml><?xml version="1.0" encoding="utf-8"?>
+<file path=ppt/slides/slide16.xml><?xml version="1.0" encoding="utf-8"?>
 <p:sld xmlns:a="http://schemas.openxmlformats.org/drawingml/2006/main" xmlns:r="http://schemas.openxmlformats.org/officeDocument/2006/relationships" xmlns:p="http://schemas.openxmlformats.org/presentationml/2006/main">
   <p:cSld>
     <p:spTree>
@@ -28764,7 +29149,7 @@
 </p:sld>
 </file>
 
-<file path=ppt/slides/slide15.xml><?xml version="1.0" encoding="utf-8"?>
+<file path=ppt/slides/slide17.xml><?xml version="1.0" encoding="utf-8"?>
 <p:sld xmlns:a="http://schemas.openxmlformats.org/drawingml/2006/main" xmlns:r="http://schemas.openxmlformats.org/officeDocument/2006/relationships" xmlns:p="http://schemas.openxmlformats.org/presentationml/2006/main">
   <p:cSld>
     <p:spTree>
@@ -28833,7 +29218,7 @@
             <a:fld id="{C263D6C4-4840-40CC-AC84-17E24B3B7BDE}" type="slidenum">
               <a:rPr lang="en-US" smtClean="0"/>
               <a:pPr/>
-              <a:t>15</a:t>
+              <a:t>17</a:t>
             </a:fld>
             <a:endParaRPr lang="en-US" dirty="0"/>
           </a:p>
@@ -28890,262 +29275,6 @@
 </file>
 
 <file path=ppt/slides/slide2.xml><?xml version="1.0" encoding="utf-8"?>
-<p:sld xmlns:a="http://schemas.openxmlformats.org/drawingml/2006/main" xmlns:r="http://schemas.openxmlformats.org/officeDocument/2006/relationships" xmlns:p="http://schemas.openxmlformats.org/presentationml/2006/main">
-  <p:cSld>
-    <p:spTree>
-      <p:nvGrpSpPr>
-        <p:cNvPr id="1" name=""/>
-        <p:cNvGrpSpPr/>
-        <p:nvPr/>
-      </p:nvGrpSpPr>
-      <p:grpSpPr>
-        <a:xfrm>
-          <a:off x="0" y="0"/>
-          <a:ext cx="0" cy="0"/>
-          <a:chOff x="0" y="0"/>
-          <a:chExt cx="0" cy="0"/>
-        </a:xfrm>
-      </p:grpSpPr>
-      <p:sp>
-        <p:nvSpPr>
-          <p:cNvPr id="4" name="Title 3">
-            <a:extLst>
-              <a:ext uri="{FF2B5EF4-FFF2-40B4-BE49-F238E27FC236}">
-                <a16:creationId xmlns:a16="http://schemas.microsoft.com/office/drawing/2014/main" id="{E3BD8413-C238-49D7-A4E1-E8FEF1811A0E}"/>
-              </a:ext>
-            </a:extLst>
-          </p:cNvPr>
-          <p:cNvSpPr>
-            <a:spLocks noGrp="1"/>
-          </p:cNvSpPr>
-          <p:nvPr>
-            <p:ph type="title"/>
-          </p:nvPr>
-        </p:nvSpPr>
-        <p:spPr/>
-        <p:txBody>
-          <a:bodyPr/>
-          <a:lstStyle/>
-          <a:p>
-            <a:r>
-              <a:rPr lang="en-US" dirty="0"/>
-              <a:t>Section Header01</a:t>
-            </a:r>
-          </a:p>
-        </p:txBody>
-      </p:sp>
-      <p:sp>
-        <p:nvSpPr>
-          <p:cNvPr id="5" name="Text Placeholder 4">
-            <a:extLst>
-              <a:ext uri="{FF2B5EF4-FFF2-40B4-BE49-F238E27FC236}">
-                <a16:creationId xmlns:a16="http://schemas.microsoft.com/office/drawing/2014/main" id="{0A95F4DE-39B7-4CE2-BC1E-8B8AE662A895}"/>
-              </a:ext>
-            </a:extLst>
-          </p:cNvPr>
-          <p:cNvSpPr>
-            <a:spLocks noGrp="1"/>
-          </p:cNvSpPr>
-          <p:nvPr>
-            <p:ph type="body" idx="1"/>
-          </p:nvPr>
-        </p:nvSpPr>
-        <p:spPr/>
-        <p:txBody>
-          <a:bodyPr/>
-          <a:lstStyle/>
-          <a:p>
-            <a:r>
-              <a:rPr lang="en-US" dirty="0"/>
-              <a:t>Subtitle</a:t>
-            </a:r>
-          </a:p>
-        </p:txBody>
-      </p:sp>
-      <p:sp>
-        <p:nvSpPr>
-          <p:cNvPr id="2" name="Slide Number Placeholder 1">
-            <a:extLst>
-              <a:ext uri="{FF2B5EF4-FFF2-40B4-BE49-F238E27FC236}">
-                <a16:creationId xmlns:a16="http://schemas.microsoft.com/office/drawing/2014/main" id="{0B24BF10-2B55-43AB-9F77-F1A1410384A9}"/>
-              </a:ext>
-            </a:extLst>
-          </p:cNvPr>
-          <p:cNvSpPr>
-            <a:spLocks noGrp="1"/>
-          </p:cNvSpPr>
-          <p:nvPr>
-            <p:ph type="sldNum" sz="quarter" idx="12"/>
-          </p:nvPr>
-        </p:nvSpPr>
-        <p:spPr/>
-        <p:txBody>
-          <a:bodyPr/>
-          <a:lstStyle/>
-          <a:p>
-            <a:fld id="{C263D6C4-4840-40CC-AC84-17E24B3B7BDE}" type="slidenum">
-              <a:rPr lang="en-US" smtClean="0"/>
-              <a:pPr/>
-              <a:t>2</a:t>
-            </a:fld>
-            <a:endParaRPr lang="en-US" dirty="0"/>
-          </a:p>
-        </p:txBody>
-      </p:sp>
-    </p:spTree>
-    <p:extLst>
-      <p:ext uri="{BB962C8B-B14F-4D97-AF65-F5344CB8AC3E}">
-        <p14:creationId xmlns:p14="http://schemas.microsoft.com/office/powerpoint/2010/main" val="2902794312"/>
-      </p:ext>
-    </p:extLst>
-  </p:cSld>
-  <p:clrMapOvr>
-    <a:masterClrMapping/>
-  </p:clrMapOvr>
-  <mc:AlternateContent xmlns:mc="http://schemas.openxmlformats.org/markup-compatibility/2006" xmlns:p14="http://schemas.microsoft.com/office/powerpoint/2010/main">
-    <mc:Choice Requires="p14">
-      <p:transition spd="med" p14:dur="700">
-        <p:fade/>
-      </p:transition>
-    </mc:Choice>
-    <mc:Fallback xmlns="">
-      <p:transition spd="med">
-        <p:fade/>
-      </p:transition>
-    </mc:Fallback>
-  </mc:AlternateContent>
-</p:sld>
-</file>
-
-<file path=ppt/slides/slide3.xml><?xml version="1.0" encoding="utf-8"?>
-<p:sld xmlns:a="http://schemas.openxmlformats.org/drawingml/2006/main" xmlns:r="http://schemas.openxmlformats.org/officeDocument/2006/relationships" xmlns:p="http://schemas.openxmlformats.org/presentationml/2006/main">
-  <p:cSld>
-    <p:spTree>
-      <p:nvGrpSpPr>
-        <p:cNvPr id="1" name=""/>
-        <p:cNvGrpSpPr/>
-        <p:nvPr/>
-      </p:nvGrpSpPr>
-      <p:grpSpPr>
-        <a:xfrm>
-          <a:off x="0" y="0"/>
-          <a:ext cx="0" cy="0"/>
-          <a:chOff x="0" y="0"/>
-          <a:chExt cx="0" cy="0"/>
-        </a:xfrm>
-      </p:grpSpPr>
-      <p:sp>
-        <p:nvSpPr>
-          <p:cNvPr id="4" name="Title 3">
-            <a:extLst>
-              <a:ext uri="{FF2B5EF4-FFF2-40B4-BE49-F238E27FC236}">
-                <a16:creationId xmlns:a16="http://schemas.microsoft.com/office/drawing/2014/main" id="{BD179B88-D43C-4A31-9A52-3498E9430782}"/>
-              </a:ext>
-            </a:extLst>
-          </p:cNvPr>
-          <p:cNvSpPr>
-            <a:spLocks noGrp="1"/>
-          </p:cNvSpPr>
-          <p:nvPr>
-            <p:ph type="title"/>
-          </p:nvPr>
-        </p:nvSpPr>
-        <p:spPr/>
-        <p:txBody>
-          <a:bodyPr/>
-          <a:lstStyle/>
-          <a:p>
-            <a:r>
-              <a:rPr lang="en-US" dirty="0"/>
-              <a:t>Section Header02</a:t>
-            </a:r>
-          </a:p>
-        </p:txBody>
-      </p:sp>
-      <p:sp>
-        <p:nvSpPr>
-          <p:cNvPr id="5" name="Text Placeholder 4">
-            <a:extLst>
-              <a:ext uri="{FF2B5EF4-FFF2-40B4-BE49-F238E27FC236}">
-                <a16:creationId xmlns:a16="http://schemas.microsoft.com/office/drawing/2014/main" id="{DCDDBE65-9AB1-4989-AF86-726591A6A128}"/>
-              </a:ext>
-            </a:extLst>
-          </p:cNvPr>
-          <p:cNvSpPr>
-            <a:spLocks noGrp="1"/>
-          </p:cNvSpPr>
-          <p:nvPr>
-            <p:ph type="body" idx="1"/>
-          </p:nvPr>
-        </p:nvSpPr>
-        <p:spPr/>
-        <p:txBody>
-          <a:bodyPr/>
-          <a:lstStyle/>
-          <a:p>
-            <a:r>
-              <a:rPr lang="en-US" dirty="0"/>
-              <a:t>Subtitle</a:t>
-            </a:r>
-          </a:p>
-        </p:txBody>
-      </p:sp>
-      <p:sp>
-        <p:nvSpPr>
-          <p:cNvPr id="2" name="Slide Number Placeholder 1">
-            <a:extLst>
-              <a:ext uri="{FF2B5EF4-FFF2-40B4-BE49-F238E27FC236}">
-                <a16:creationId xmlns:a16="http://schemas.microsoft.com/office/drawing/2014/main" id="{8B065C75-272B-4BB5-BA23-D80E8654D621}"/>
-              </a:ext>
-            </a:extLst>
-          </p:cNvPr>
-          <p:cNvSpPr>
-            <a:spLocks noGrp="1"/>
-          </p:cNvSpPr>
-          <p:nvPr>
-            <p:ph type="sldNum" sz="quarter" idx="12"/>
-          </p:nvPr>
-        </p:nvSpPr>
-        <p:spPr/>
-        <p:txBody>
-          <a:bodyPr/>
-          <a:lstStyle/>
-          <a:p>
-            <a:fld id="{C263D6C4-4840-40CC-AC84-17E24B3B7BDE}" type="slidenum">
-              <a:rPr lang="en-US" smtClean="0"/>
-              <a:pPr/>
-              <a:t>3</a:t>
-            </a:fld>
-            <a:endParaRPr lang="en-US" dirty="0"/>
-          </a:p>
-        </p:txBody>
-      </p:sp>
-    </p:spTree>
-    <p:extLst>
-      <p:ext uri="{BB962C8B-B14F-4D97-AF65-F5344CB8AC3E}">
-        <p14:creationId xmlns:p14="http://schemas.microsoft.com/office/powerpoint/2010/main" val="709828751"/>
-      </p:ext>
-    </p:extLst>
-  </p:cSld>
-  <p:clrMapOvr>
-    <a:masterClrMapping/>
-  </p:clrMapOvr>
-  <mc:AlternateContent xmlns:mc="http://schemas.openxmlformats.org/markup-compatibility/2006" xmlns:p14="http://schemas.microsoft.com/office/powerpoint/2010/main">
-    <mc:Choice Requires="p14">
-      <p:transition spd="med" p14:dur="700">
-        <p:fade/>
-      </p:transition>
-    </mc:Choice>
-    <mc:Fallback xmlns="">
-      <p:transition spd="med">
-        <p:fade/>
-      </p:transition>
-    </mc:Fallback>
-  </mc:AlternateContent>
-</p:sld>
-</file>
-
-<file path=ppt/slides/slide4.xml><?xml version="1.0" encoding="utf-8"?>
 <p:sld xmlns:a="http://schemas.openxmlformats.org/drawingml/2006/main" xmlns:r="http://schemas.openxmlformats.org/officeDocument/2006/relationships" xmlns:p="http://schemas.openxmlformats.org/presentationml/2006/main">
   <p:cSld>
     <p:spTree>
@@ -29308,7 +29437,7 @@
             <a:fld id="{C263D6C4-4840-40CC-AC84-17E24B3B7BDE}" type="slidenum">
               <a:rPr lang="en-US" smtClean="0"/>
               <a:pPr/>
-              <a:t>4</a:t>
+              <a:t>2</a:t>
             </a:fld>
             <a:endParaRPr lang="en-US" dirty="0"/>
           </a:p>
@@ -29339,7 +29468,7 @@
 </p:sld>
 </file>
 
-<file path=ppt/slides/slide5.xml><?xml version="1.0" encoding="utf-8"?>
+<file path=ppt/slides/slide3.xml><?xml version="1.0" encoding="utf-8"?>
 <p:sld xmlns:a="http://schemas.openxmlformats.org/drawingml/2006/main" xmlns:r="http://schemas.openxmlformats.org/officeDocument/2006/relationships" xmlns:p="http://schemas.openxmlformats.org/presentationml/2006/main">
   <p:cSld>
     <p:spTree>
@@ -29481,7 +29610,7 @@
             <a:fld id="{C263D6C4-4840-40CC-AC84-17E24B3B7BDE}" type="slidenum">
               <a:rPr lang="en-US" smtClean="0"/>
               <a:pPr/>
-              <a:t>5</a:t>
+              <a:t>3</a:t>
             </a:fld>
             <a:endParaRPr lang="en-US" dirty="0"/>
           </a:p>
@@ -29512,7 +29641,523 @@
 </p:sld>
 </file>
 
+<file path=ppt/slides/slide4.xml><?xml version="1.0" encoding="utf-8"?>
+<p:sld xmlns:a="http://schemas.openxmlformats.org/drawingml/2006/main" xmlns:r="http://schemas.openxmlformats.org/officeDocument/2006/relationships" xmlns:p="http://schemas.openxmlformats.org/presentationml/2006/main">
+  <p:cSld>
+    <p:spTree>
+      <p:nvGrpSpPr>
+        <p:cNvPr id="1" name=""/>
+        <p:cNvGrpSpPr/>
+        <p:nvPr/>
+      </p:nvGrpSpPr>
+      <p:grpSpPr>
+        <a:xfrm>
+          <a:off x="0" y="0"/>
+          <a:ext cx="0" cy="0"/>
+          <a:chOff x="0" y="0"/>
+          <a:chExt cx="0" cy="0"/>
+        </a:xfrm>
+      </p:grpSpPr>
+      <p:sp>
+        <p:nvSpPr>
+          <p:cNvPr id="7" name="Title 6">
+            <a:extLst>
+              <a:ext uri="{FF2B5EF4-FFF2-40B4-BE49-F238E27FC236}">
+                <a16:creationId xmlns:a16="http://schemas.microsoft.com/office/drawing/2014/main" id="{7875C19A-1AAE-476A-A316-A2CF92D763D3}"/>
+              </a:ext>
+            </a:extLst>
+          </p:cNvPr>
+          <p:cNvSpPr>
+            <a:spLocks noGrp="1"/>
+          </p:cNvSpPr>
+          <p:nvPr>
+            <p:ph type="title"/>
+          </p:nvPr>
+        </p:nvSpPr>
+        <p:spPr/>
+        <p:txBody>
+          <a:bodyPr/>
+          <a:lstStyle/>
+          <a:p>
+            <a:r>
+              <a:rPr lang="en-US" dirty="0"/>
+              <a:t>Project Structure</a:t>
+            </a:r>
+          </a:p>
+        </p:txBody>
+      </p:sp>
+      <p:sp>
+        <p:nvSpPr>
+          <p:cNvPr id="2" name="Slide Number Placeholder 1">
+            <a:extLst>
+              <a:ext uri="{FF2B5EF4-FFF2-40B4-BE49-F238E27FC236}">
+                <a16:creationId xmlns:a16="http://schemas.microsoft.com/office/drawing/2014/main" id="{BE9800F6-D571-48C4-8466-12AA1ADB6599}"/>
+              </a:ext>
+            </a:extLst>
+          </p:cNvPr>
+          <p:cNvSpPr>
+            <a:spLocks noGrp="1"/>
+          </p:cNvSpPr>
+          <p:nvPr>
+            <p:ph type="sldNum" sz="quarter" idx="12"/>
+          </p:nvPr>
+        </p:nvSpPr>
+        <p:spPr/>
+        <p:txBody>
+          <a:bodyPr/>
+          <a:lstStyle/>
+          <a:p>
+            <a:fld id="{C263D6C4-4840-40CC-AC84-17E24B3B7BDE}" type="slidenum">
+              <a:rPr lang="en-US" smtClean="0"/>
+              <a:pPr/>
+              <a:t>4</a:t>
+            </a:fld>
+            <a:endParaRPr lang="en-US" dirty="0"/>
+          </a:p>
+        </p:txBody>
+      </p:sp>
+      <p:pic>
+        <p:nvPicPr>
+          <p:cNvPr id="6" name="Picture 5" descr="A diagram of a computer network&#10;&#10;Description automatically generated">
+            <a:extLst>
+              <a:ext uri="{FF2B5EF4-FFF2-40B4-BE49-F238E27FC236}">
+                <a16:creationId xmlns:a16="http://schemas.microsoft.com/office/drawing/2014/main" id="{B26C75ED-3941-5985-D545-611BACA95BB7}"/>
+              </a:ext>
+            </a:extLst>
+          </p:cNvPr>
+          <p:cNvPicPr>
+            <a:picLocks noChangeAspect="1"/>
+          </p:cNvPicPr>
+          <p:nvPr/>
+        </p:nvPicPr>
+        <p:blipFill>
+          <a:blip r:embed="rId2"/>
+          <a:stretch>
+            <a:fillRect/>
+          </a:stretch>
+        </p:blipFill>
+        <p:spPr>
+          <a:xfrm>
+            <a:off x="1433512" y="1181100"/>
+            <a:ext cx="9324975" cy="4495800"/>
+          </a:xfrm>
+          <a:prstGeom prst="rect">
+            <a:avLst/>
+          </a:prstGeom>
+        </p:spPr>
+      </p:pic>
+    </p:spTree>
+    <p:extLst>
+      <p:ext uri="{BB962C8B-B14F-4D97-AF65-F5344CB8AC3E}">
+        <p14:creationId xmlns:p14="http://schemas.microsoft.com/office/powerpoint/2010/main" val="690193934"/>
+      </p:ext>
+    </p:extLst>
+  </p:cSld>
+  <p:clrMapOvr>
+    <a:masterClrMapping/>
+  </p:clrMapOvr>
+  <mc:AlternateContent xmlns:mc="http://schemas.openxmlformats.org/markup-compatibility/2006" xmlns:p14="http://schemas.microsoft.com/office/powerpoint/2010/main">
+    <mc:Choice Requires="p14">
+      <p:transition spd="med" p14:dur="700">
+        <p:fade/>
+      </p:transition>
+    </mc:Choice>
+    <mc:Fallback xmlns="">
+      <p:transition spd="med">
+        <p:fade/>
+      </p:transition>
+    </mc:Fallback>
+  </mc:AlternateContent>
+</p:sld>
+</file>
+
+<file path=ppt/slides/slide5.xml><?xml version="1.0" encoding="utf-8"?>
+<p:sld xmlns:a="http://schemas.openxmlformats.org/drawingml/2006/main" xmlns:r="http://schemas.openxmlformats.org/officeDocument/2006/relationships" xmlns:p="http://schemas.openxmlformats.org/presentationml/2006/main">
+  <p:cSld>
+    <p:spTree>
+      <p:nvGrpSpPr>
+        <p:cNvPr id="1" name=""/>
+        <p:cNvGrpSpPr/>
+        <p:nvPr/>
+      </p:nvGrpSpPr>
+      <p:grpSpPr>
+        <a:xfrm>
+          <a:off x="0" y="0"/>
+          <a:ext cx="0" cy="0"/>
+          <a:chOff x="0" y="0"/>
+          <a:chExt cx="0" cy="0"/>
+        </a:xfrm>
+      </p:grpSpPr>
+      <p:sp>
+        <p:nvSpPr>
+          <p:cNvPr id="7" name="Title 6">
+            <a:extLst>
+              <a:ext uri="{FF2B5EF4-FFF2-40B4-BE49-F238E27FC236}">
+                <a16:creationId xmlns:a16="http://schemas.microsoft.com/office/drawing/2014/main" id="{7875C19A-1AAE-476A-A316-A2CF92D763D3}"/>
+              </a:ext>
+            </a:extLst>
+          </p:cNvPr>
+          <p:cNvSpPr>
+            <a:spLocks noGrp="1"/>
+          </p:cNvSpPr>
+          <p:nvPr>
+            <p:ph type="title"/>
+          </p:nvPr>
+        </p:nvSpPr>
+        <p:spPr/>
+        <p:txBody>
+          <a:bodyPr/>
+          <a:lstStyle/>
+          <a:p>
+            <a:r>
+              <a:rPr lang="en-US" dirty="0"/>
+              <a:t>Database Structure</a:t>
+            </a:r>
+          </a:p>
+        </p:txBody>
+      </p:sp>
+      <p:sp>
+        <p:nvSpPr>
+          <p:cNvPr id="2" name="Slide Number Placeholder 1">
+            <a:extLst>
+              <a:ext uri="{FF2B5EF4-FFF2-40B4-BE49-F238E27FC236}">
+                <a16:creationId xmlns:a16="http://schemas.microsoft.com/office/drawing/2014/main" id="{BE9800F6-D571-48C4-8466-12AA1ADB6599}"/>
+              </a:ext>
+            </a:extLst>
+          </p:cNvPr>
+          <p:cNvSpPr>
+            <a:spLocks noGrp="1"/>
+          </p:cNvSpPr>
+          <p:nvPr>
+            <p:ph type="sldNum" sz="quarter" idx="12"/>
+          </p:nvPr>
+        </p:nvSpPr>
+        <p:spPr/>
+        <p:txBody>
+          <a:bodyPr/>
+          <a:lstStyle/>
+          <a:p>
+            <a:fld id="{C263D6C4-4840-40CC-AC84-17E24B3B7BDE}" type="slidenum">
+              <a:rPr lang="en-US" smtClean="0"/>
+              <a:pPr/>
+              <a:t>5</a:t>
+            </a:fld>
+            <a:endParaRPr lang="en-US" dirty="0"/>
+          </a:p>
+        </p:txBody>
+      </p:sp>
+      <p:pic>
+        <p:nvPicPr>
+          <p:cNvPr id="6" name="Picture 5" descr="A screenshot of a computer&#10;&#10;Description automatically generated">
+            <a:extLst>
+              <a:ext uri="{FF2B5EF4-FFF2-40B4-BE49-F238E27FC236}">
+                <a16:creationId xmlns:a16="http://schemas.microsoft.com/office/drawing/2014/main" id="{F31E0E02-733C-13E0-1D91-D7620F984A0A}"/>
+              </a:ext>
+            </a:extLst>
+          </p:cNvPr>
+          <p:cNvPicPr>
+            <a:picLocks noChangeAspect="1"/>
+          </p:cNvPicPr>
+          <p:nvPr/>
+        </p:nvPicPr>
+        <p:blipFill>
+          <a:blip r:embed="rId2"/>
+          <a:stretch>
+            <a:fillRect/>
+          </a:stretch>
+        </p:blipFill>
+        <p:spPr>
+          <a:xfrm>
+            <a:off x="4868718" y="1094438"/>
+            <a:ext cx="6670128" cy="5204654"/>
+          </a:xfrm>
+          <a:prstGeom prst="rect">
+            <a:avLst/>
+          </a:prstGeom>
+        </p:spPr>
+      </p:pic>
+    </p:spTree>
+    <p:extLst>
+      <p:ext uri="{BB962C8B-B14F-4D97-AF65-F5344CB8AC3E}">
+        <p14:creationId xmlns:p14="http://schemas.microsoft.com/office/powerpoint/2010/main" val="1408203661"/>
+      </p:ext>
+    </p:extLst>
+  </p:cSld>
+  <p:clrMapOvr>
+    <a:masterClrMapping/>
+  </p:clrMapOvr>
+  <mc:AlternateContent xmlns:mc="http://schemas.openxmlformats.org/markup-compatibility/2006" xmlns:p14="http://schemas.microsoft.com/office/powerpoint/2010/main">
+    <mc:Choice Requires="p14">
+      <p:transition spd="med" p14:dur="700">
+        <p:fade/>
+      </p:transition>
+    </mc:Choice>
+    <mc:Fallback xmlns="">
+      <p:transition spd="med">
+        <p:fade/>
+      </p:transition>
+    </mc:Fallback>
+  </mc:AlternateContent>
+</p:sld>
+</file>
+
 <file path=ppt/slides/slide6.xml><?xml version="1.0" encoding="utf-8"?>
+<p:sld xmlns:a="http://schemas.openxmlformats.org/drawingml/2006/main" xmlns:r="http://schemas.openxmlformats.org/officeDocument/2006/relationships" xmlns:p="http://schemas.openxmlformats.org/presentationml/2006/main">
+  <p:cSld>
+    <p:spTree>
+      <p:nvGrpSpPr>
+        <p:cNvPr id="1" name=""/>
+        <p:cNvGrpSpPr/>
+        <p:nvPr/>
+      </p:nvGrpSpPr>
+      <p:grpSpPr>
+        <a:xfrm>
+          <a:off x="0" y="0"/>
+          <a:ext cx="0" cy="0"/>
+          <a:chOff x="0" y="0"/>
+          <a:chExt cx="0" cy="0"/>
+        </a:xfrm>
+      </p:grpSpPr>
+      <p:sp>
+        <p:nvSpPr>
+          <p:cNvPr id="4" name="Title 3">
+            <a:extLst>
+              <a:ext uri="{FF2B5EF4-FFF2-40B4-BE49-F238E27FC236}">
+                <a16:creationId xmlns:a16="http://schemas.microsoft.com/office/drawing/2014/main" id="{E3BD8413-C238-49D7-A4E1-E8FEF1811A0E}"/>
+              </a:ext>
+            </a:extLst>
+          </p:cNvPr>
+          <p:cNvSpPr>
+            <a:spLocks noGrp="1"/>
+          </p:cNvSpPr>
+          <p:nvPr>
+            <p:ph type="title"/>
+          </p:nvPr>
+        </p:nvSpPr>
+        <p:spPr/>
+        <p:txBody>
+          <a:bodyPr/>
+          <a:lstStyle/>
+          <a:p>
+            <a:r>
+              <a:rPr lang="en-US" dirty="0"/>
+              <a:t>Section Header01</a:t>
+            </a:r>
+          </a:p>
+        </p:txBody>
+      </p:sp>
+      <p:sp>
+        <p:nvSpPr>
+          <p:cNvPr id="5" name="Text Placeholder 4">
+            <a:extLst>
+              <a:ext uri="{FF2B5EF4-FFF2-40B4-BE49-F238E27FC236}">
+                <a16:creationId xmlns:a16="http://schemas.microsoft.com/office/drawing/2014/main" id="{0A95F4DE-39B7-4CE2-BC1E-8B8AE662A895}"/>
+              </a:ext>
+            </a:extLst>
+          </p:cNvPr>
+          <p:cNvSpPr>
+            <a:spLocks noGrp="1"/>
+          </p:cNvSpPr>
+          <p:nvPr>
+            <p:ph type="body" idx="1"/>
+          </p:nvPr>
+        </p:nvSpPr>
+        <p:spPr/>
+        <p:txBody>
+          <a:bodyPr/>
+          <a:lstStyle/>
+          <a:p>
+            <a:r>
+              <a:rPr lang="en-US" dirty="0"/>
+              <a:t>Subtitle</a:t>
+            </a:r>
+          </a:p>
+        </p:txBody>
+      </p:sp>
+      <p:sp>
+        <p:nvSpPr>
+          <p:cNvPr id="2" name="Slide Number Placeholder 1">
+            <a:extLst>
+              <a:ext uri="{FF2B5EF4-FFF2-40B4-BE49-F238E27FC236}">
+                <a16:creationId xmlns:a16="http://schemas.microsoft.com/office/drawing/2014/main" id="{0B24BF10-2B55-43AB-9F77-F1A1410384A9}"/>
+              </a:ext>
+            </a:extLst>
+          </p:cNvPr>
+          <p:cNvSpPr>
+            <a:spLocks noGrp="1"/>
+          </p:cNvSpPr>
+          <p:nvPr>
+            <p:ph type="sldNum" sz="quarter" idx="12"/>
+          </p:nvPr>
+        </p:nvSpPr>
+        <p:spPr/>
+        <p:txBody>
+          <a:bodyPr/>
+          <a:lstStyle/>
+          <a:p>
+            <a:fld id="{C263D6C4-4840-40CC-AC84-17E24B3B7BDE}" type="slidenum">
+              <a:rPr lang="en-US" smtClean="0"/>
+              <a:pPr/>
+              <a:t>6</a:t>
+            </a:fld>
+            <a:endParaRPr lang="en-US" dirty="0"/>
+          </a:p>
+        </p:txBody>
+      </p:sp>
+    </p:spTree>
+    <p:extLst>
+      <p:ext uri="{BB962C8B-B14F-4D97-AF65-F5344CB8AC3E}">
+        <p14:creationId xmlns:p14="http://schemas.microsoft.com/office/powerpoint/2010/main" val="2902794312"/>
+      </p:ext>
+    </p:extLst>
+  </p:cSld>
+  <p:clrMapOvr>
+    <a:masterClrMapping/>
+  </p:clrMapOvr>
+  <mc:AlternateContent xmlns:mc="http://schemas.openxmlformats.org/markup-compatibility/2006" xmlns:p14="http://schemas.microsoft.com/office/powerpoint/2010/main">
+    <mc:Choice Requires="p14">
+      <p:transition spd="med" p14:dur="700">
+        <p:fade/>
+      </p:transition>
+    </mc:Choice>
+    <mc:Fallback xmlns="">
+      <p:transition spd="med">
+        <p:fade/>
+      </p:transition>
+    </mc:Fallback>
+  </mc:AlternateContent>
+</p:sld>
+</file>
+
+<file path=ppt/slides/slide7.xml><?xml version="1.0" encoding="utf-8"?>
+<p:sld xmlns:a="http://schemas.openxmlformats.org/drawingml/2006/main" xmlns:r="http://schemas.openxmlformats.org/officeDocument/2006/relationships" xmlns:p="http://schemas.openxmlformats.org/presentationml/2006/main">
+  <p:cSld>
+    <p:spTree>
+      <p:nvGrpSpPr>
+        <p:cNvPr id="1" name=""/>
+        <p:cNvGrpSpPr/>
+        <p:nvPr/>
+      </p:nvGrpSpPr>
+      <p:grpSpPr>
+        <a:xfrm>
+          <a:off x="0" y="0"/>
+          <a:ext cx="0" cy="0"/>
+          <a:chOff x="0" y="0"/>
+          <a:chExt cx="0" cy="0"/>
+        </a:xfrm>
+      </p:grpSpPr>
+      <p:sp>
+        <p:nvSpPr>
+          <p:cNvPr id="4" name="Title 3">
+            <a:extLst>
+              <a:ext uri="{FF2B5EF4-FFF2-40B4-BE49-F238E27FC236}">
+                <a16:creationId xmlns:a16="http://schemas.microsoft.com/office/drawing/2014/main" id="{BD179B88-D43C-4A31-9A52-3498E9430782}"/>
+              </a:ext>
+            </a:extLst>
+          </p:cNvPr>
+          <p:cNvSpPr>
+            <a:spLocks noGrp="1"/>
+          </p:cNvSpPr>
+          <p:nvPr>
+            <p:ph type="title"/>
+          </p:nvPr>
+        </p:nvSpPr>
+        <p:spPr/>
+        <p:txBody>
+          <a:bodyPr/>
+          <a:lstStyle/>
+          <a:p>
+            <a:r>
+              <a:rPr lang="en-US" dirty="0"/>
+              <a:t>Section Header02</a:t>
+            </a:r>
+          </a:p>
+        </p:txBody>
+      </p:sp>
+      <p:sp>
+        <p:nvSpPr>
+          <p:cNvPr id="5" name="Text Placeholder 4">
+            <a:extLst>
+              <a:ext uri="{FF2B5EF4-FFF2-40B4-BE49-F238E27FC236}">
+                <a16:creationId xmlns:a16="http://schemas.microsoft.com/office/drawing/2014/main" id="{DCDDBE65-9AB1-4989-AF86-726591A6A128}"/>
+              </a:ext>
+            </a:extLst>
+          </p:cNvPr>
+          <p:cNvSpPr>
+            <a:spLocks noGrp="1"/>
+          </p:cNvSpPr>
+          <p:nvPr>
+            <p:ph type="body" idx="1"/>
+          </p:nvPr>
+        </p:nvSpPr>
+        <p:spPr/>
+        <p:txBody>
+          <a:bodyPr/>
+          <a:lstStyle/>
+          <a:p>
+            <a:r>
+              <a:rPr lang="en-US" dirty="0"/>
+              <a:t>Subtitle</a:t>
+            </a:r>
+          </a:p>
+        </p:txBody>
+      </p:sp>
+      <p:sp>
+        <p:nvSpPr>
+          <p:cNvPr id="2" name="Slide Number Placeholder 1">
+            <a:extLst>
+              <a:ext uri="{FF2B5EF4-FFF2-40B4-BE49-F238E27FC236}">
+                <a16:creationId xmlns:a16="http://schemas.microsoft.com/office/drawing/2014/main" id="{8B065C75-272B-4BB5-BA23-D80E8654D621}"/>
+              </a:ext>
+            </a:extLst>
+          </p:cNvPr>
+          <p:cNvSpPr>
+            <a:spLocks noGrp="1"/>
+          </p:cNvSpPr>
+          <p:nvPr>
+            <p:ph type="sldNum" sz="quarter" idx="12"/>
+          </p:nvPr>
+        </p:nvSpPr>
+        <p:spPr/>
+        <p:txBody>
+          <a:bodyPr/>
+          <a:lstStyle/>
+          <a:p>
+            <a:fld id="{C263D6C4-4840-40CC-AC84-17E24B3B7BDE}" type="slidenum">
+              <a:rPr lang="en-US" smtClean="0"/>
+              <a:pPr/>
+              <a:t>7</a:t>
+            </a:fld>
+            <a:endParaRPr lang="en-US" dirty="0"/>
+          </a:p>
+        </p:txBody>
+      </p:sp>
+    </p:spTree>
+    <p:extLst>
+      <p:ext uri="{BB962C8B-B14F-4D97-AF65-F5344CB8AC3E}">
+        <p14:creationId xmlns:p14="http://schemas.microsoft.com/office/powerpoint/2010/main" val="709828751"/>
+      </p:ext>
+    </p:extLst>
+  </p:cSld>
+  <p:clrMapOvr>
+    <a:masterClrMapping/>
+  </p:clrMapOvr>
+  <mc:AlternateContent xmlns:mc="http://schemas.openxmlformats.org/markup-compatibility/2006" xmlns:p14="http://schemas.microsoft.com/office/powerpoint/2010/main">
+    <mc:Choice Requires="p14">
+      <p:transition spd="med" p14:dur="700">
+        <p:fade/>
+      </p:transition>
+    </mc:Choice>
+    <mc:Fallback xmlns="">
+      <p:transition spd="med">
+        <p:fade/>
+      </p:transition>
+    </mc:Fallback>
+  </mc:AlternateContent>
+</p:sld>
+</file>
+
+<file path=ppt/slides/slide8.xml><?xml version="1.0" encoding="utf-8"?>
 <p:sld xmlns:a="http://schemas.openxmlformats.org/drawingml/2006/main" xmlns:r="http://schemas.openxmlformats.org/officeDocument/2006/relationships" xmlns:p="http://schemas.openxmlformats.org/presentationml/2006/main">
   <p:cSld>
     <p:spTree>
@@ -29581,7 +30226,7 @@
             <a:fld id="{C263D6C4-4840-40CC-AC84-17E24B3B7BDE}" type="slidenum">
               <a:rPr lang="en-US" smtClean="0"/>
               <a:pPr/>
-              <a:t>6</a:t>
+              <a:t>8</a:t>
             </a:fld>
             <a:endParaRPr lang="en-US" dirty="0"/>
           </a:p>
@@ -29745,7 +30390,7 @@
 </p:sld>
 </file>
 
-<file path=ppt/slides/slide7.xml><?xml version="1.0" encoding="utf-8"?>
+<file path=ppt/slides/slide9.xml><?xml version="1.0" encoding="utf-8"?>
 <p:sld xmlns:a="http://schemas.openxmlformats.org/drawingml/2006/main" xmlns:r="http://schemas.openxmlformats.org/officeDocument/2006/relationships" xmlns:p="http://schemas.openxmlformats.org/presentationml/2006/main">
   <p:cSld>
     <p:spTree>
@@ -30129,7 +30774,7 @@
             <a:fld id="{C263D6C4-4840-40CC-AC84-17E24B3B7BDE}" type="slidenum">
               <a:rPr lang="en-US" smtClean="0"/>
               <a:pPr/>
-              <a:t>7</a:t>
+              <a:t>9</a:t>
             </a:fld>
             <a:endParaRPr lang="en-US" dirty="0"/>
           </a:p>
@@ -30139,389 +30784,6 @@
     <p:extLst>
       <p:ext uri="{BB962C8B-B14F-4D97-AF65-F5344CB8AC3E}">
         <p14:creationId xmlns:p14="http://schemas.microsoft.com/office/powerpoint/2010/main" val="3892131414"/>
-      </p:ext>
-    </p:extLst>
-  </p:cSld>
-  <p:clrMapOvr>
-    <a:masterClrMapping/>
-  </p:clrMapOvr>
-  <mc:AlternateContent xmlns:mc="http://schemas.openxmlformats.org/markup-compatibility/2006" xmlns:p14="http://schemas.microsoft.com/office/powerpoint/2010/main">
-    <mc:Choice Requires="p14">
-      <p:transition spd="med" p14:dur="700">
-        <p:fade/>
-      </p:transition>
-    </mc:Choice>
-    <mc:Fallback xmlns="">
-      <p:transition spd="med">
-        <p:fade/>
-      </p:transition>
-    </mc:Fallback>
-  </mc:AlternateContent>
-</p:sld>
-</file>
-
-<file path=ppt/slides/slide8.xml><?xml version="1.0" encoding="utf-8"?>
-<p:sld xmlns:a="http://schemas.openxmlformats.org/drawingml/2006/main" xmlns:r="http://schemas.openxmlformats.org/officeDocument/2006/relationships" xmlns:p="http://schemas.openxmlformats.org/presentationml/2006/main">
-  <p:cSld>
-    <p:spTree>
-      <p:nvGrpSpPr>
-        <p:cNvPr id="1" name=""/>
-        <p:cNvGrpSpPr/>
-        <p:nvPr/>
-      </p:nvGrpSpPr>
-      <p:grpSpPr>
-        <a:xfrm>
-          <a:off x="0" y="0"/>
-          <a:ext cx="0" cy="0"/>
-          <a:chOff x="0" y="0"/>
-          <a:chExt cx="0" cy="0"/>
-        </a:xfrm>
-      </p:grpSpPr>
-      <p:sp>
-        <p:nvSpPr>
-          <p:cNvPr id="4" name="Title 3">
-            <a:extLst>
-              <a:ext uri="{FF2B5EF4-FFF2-40B4-BE49-F238E27FC236}">
-                <a16:creationId xmlns:a16="http://schemas.microsoft.com/office/drawing/2014/main" id="{315E3981-F0D7-482C-A8E0-6A57700BECA7}"/>
-              </a:ext>
-            </a:extLst>
-          </p:cNvPr>
-          <p:cNvSpPr>
-            <a:spLocks noGrp="1"/>
-          </p:cNvSpPr>
-          <p:nvPr>
-            <p:ph type="title"/>
-          </p:nvPr>
-        </p:nvSpPr>
-        <p:spPr/>
-        <p:txBody>
-          <a:bodyPr/>
-          <a:lstStyle/>
-          <a:p>
-            <a:r>
-              <a:rPr lang="en-US" dirty="0"/>
-              <a:t>Content Title 03</a:t>
-            </a:r>
-          </a:p>
-        </p:txBody>
-      </p:sp>
-      <p:pic>
-        <p:nvPicPr>
-          <p:cNvPr id="20" name="Picture Placeholder 19" descr="Triangular pattern design with dimension">
-            <a:extLst>
-              <a:ext uri="{FF2B5EF4-FFF2-40B4-BE49-F238E27FC236}">
-                <a16:creationId xmlns:a16="http://schemas.microsoft.com/office/drawing/2014/main" id="{3DCA2B8E-64D3-7645-8DEB-688ED5756F52}"/>
-              </a:ext>
-            </a:extLst>
-          </p:cNvPr>
-          <p:cNvPicPr>
-            <a:picLocks noGrp="1" noChangeAspect="1"/>
-          </p:cNvPicPr>
-          <p:nvPr>
-            <p:ph type="pic" sz="quarter" idx="19"/>
-          </p:nvPr>
-        </p:nvPicPr>
-        <p:blipFill>
-          <a:blip r:embed="rId2">
-            <a:extLst>
-              <a:ext uri="{28A0092B-C50C-407E-A947-70E740481C1C}">
-                <a14:useLocalDpi xmlns:a14="http://schemas.microsoft.com/office/drawing/2010/main" val="0"/>
-              </a:ext>
-            </a:extLst>
-          </a:blip>
-          <a:srcRect/>
-          <a:stretch>
-            <a:fillRect/>
-          </a:stretch>
-        </p:blipFill>
-        <p:spPr/>
-      </p:pic>
-      <p:sp>
-        <p:nvSpPr>
-          <p:cNvPr id="19" name="Text Placeholder 18">
-            <a:extLst>
-              <a:ext uri="{FF2B5EF4-FFF2-40B4-BE49-F238E27FC236}">
-                <a16:creationId xmlns:a16="http://schemas.microsoft.com/office/drawing/2014/main" id="{782206B1-586F-4254-9B36-D06C4E294ACF}"/>
-              </a:ext>
-            </a:extLst>
-          </p:cNvPr>
-          <p:cNvSpPr>
-            <a:spLocks noGrp="1"/>
-          </p:cNvSpPr>
-          <p:nvPr>
-            <p:ph type="body" sz="quarter" idx="18"/>
-          </p:nvPr>
-        </p:nvSpPr>
-        <p:spPr/>
-        <p:txBody>
-          <a:bodyPr/>
-          <a:lstStyle/>
-          <a:p>
-            <a:r>
-              <a:rPr lang="en-US" dirty="0"/>
-              <a:t>Caption01 appears here</a:t>
-            </a:r>
-          </a:p>
-        </p:txBody>
-      </p:sp>
-      <p:sp>
-        <p:nvSpPr>
-          <p:cNvPr id="21" name="Text Placeholder 20">
-            <a:extLst>
-              <a:ext uri="{FF2B5EF4-FFF2-40B4-BE49-F238E27FC236}">
-                <a16:creationId xmlns:a16="http://schemas.microsoft.com/office/drawing/2014/main" id="{1B8F0371-4F69-4131-91BF-9AB99E6EE89B}"/>
-              </a:ext>
-            </a:extLst>
-          </p:cNvPr>
-          <p:cNvSpPr>
-            <a:spLocks noGrp="1"/>
-          </p:cNvSpPr>
-          <p:nvPr>
-            <p:ph type="body" sz="quarter" idx="20"/>
-          </p:nvPr>
-        </p:nvSpPr>
-        <p:spPr/>
-        <p:txBody>
-          <a:bodyPr/>
-          <a:lstStyle/>
-          <a:p>
-            <a:r>
-              <a:rPr lang="en-US" dirty="0"/>
-              <a:t>Caption03 appears here</a:t>
-            </a:r>
-          </a:p>
-        </p:txBody>
-      </p:sp>
-      <p:sp>
-        <p:nvSpPr>
-          <p:cNvPr id="22" name="Text Placeholder 21">
-            <a:extLst>
-              <a:ext uri="{FF2B5EF4-FFF2-40B4-BE49-F238E27FC236}">
-                <a16:creationId xmlns:a16="http://schemas.microsoft.com/office/drawing/2014/main" id="{78CACAF1-61EA-4605-A8FE-2EEE752B49FF}"/>
-              </a:ext>
-            </a:extLst>
-          </p:cNvPr>
-          <p:cNvSpPr>
-            <a:spLocks noGrp="1"/>
-          </p:cNvSpPr>
-          <p:nvPr>
-            <p:ph type="body" sz="quarter" idx="21"/>
-          </p:nvPr>
-        </p:nvSpPr>
-        <p:spPr/>
-        <p:txBody>
-          <a:bodyPr/>
-          <a:lstStyle/>
-          <a:p>
-            <a:r>
-              <a:rPr lang="en-US" dirty="0"/>
-              <a:t>Caption04 appears here</a:t>
-            </a:r>
-          </a:p>
-        </p:txBody>
-      </p:sp>
-      <p:sp>
-        <p:nvSpPr>
-          <p:cNvPr id="2" name="Slide Number Placeholder 1">
-            <a:extLst>
-              <a:ext uri="{FF2B5EF4-FFF2-40B4-BE49-F238E27FC236}">
-                <a16:creationId xmlns:a16="http://schemas.microsoft.com/office/drawing/2014/main" id="{2F478C69-0A1D-45FF-8600-ED903803FFE1}"/>
-              </a:ext>
-            </a:extLst>
-          </p:cNvPr>
-          <p:cNvSpPr>
-            <a:spLocks noGrp="1"/>
-          </p:cNvSpPr>
-          <p:nvPr>
-            <p:ph type="sldNum" sz="quarter" idx="12"/>
-          </p:nvPr>
-        </p:nvSpPr>
-        <p:spPr/>
-        <p:txBody>
-          <a:bodyPr/>
-          <a:lstStyle/>
-          <a:p>
-            <a:fld id="{C263D6C4-4840-40CC-AC84-17E24B3B7BDE}" type="slidenum">
-              <a:rPr lang="en-US" smtClean="0"/>
-              <a:pPr/>
-              <a:t>8</a:t>
-            </a:fld>
-            <a:endParaRPr lang="en-US" dirty="0"/>
-          </a:p>
-        </p:txBody>
-      </p:sp>
-    </p:spTree>
-    <p:extLst>
-      <p:ext uri="{BB962C8B-B14F-4D97-AF65-F5344CB8AC3E}">
-        <p14:creationId xmlns:p14="http://schemas.microsoft.com/office/powerpoint/2010/main" val="451187730"/>
-      </p:ext>
-    </p:extLst>
-  </p:cSld>
-  <p:clrMapOvr>
-    <a:masterClrMapping/>
-  </p:clrMapOvr>
-  <mc:AlternateContent xmlns:mc="http://schemas.openxmlformats.org/markup-compatibility/2006" xmlns:p14="http://schemas.microsoft.com/office/powerpoint/2010/main">
-    <mc:Choice Requires="p14">
-      <p:transition spd="med" p14:dur="700">
-        <p:fade/>
-      </p:transition>
-    </mc:Choice>
-    <mc:Fallback xmlns="">
-      <p:transition spd="med">
-        <p:fade/>
-      </p:transition>
-    </mc:Fallback>
-  </mc:AlternateContent>
-</p:sld>
-</file>
-
-<file path=ppt/slides/slide9.xml><?xml version="1.0" encoding="utf-8"?>
-<p:sld xmlns:a="http://schemas.openxmlformats.org/drawingml/2006/main" xmlns:r="http://schemas.openxmlformats.org/officeDocument/2006/relationships" xmlns:p="http://schemas.openxmlformats.org/presentationml/2006/main">
-  <p:cSld>
-    <p:spTree>
-      <p:nvGrpSpPr>
-        <p:cNvPr id="1" name=""/>
-        <p:cNvGrpSpPr/>
-        <p:nvPr/>
-      </p:nvGrpSpPr>
-      <p:grpSpPr>
-        <a:xfrm>
-          <a:off x="0" y="0"/>
-          <a:ext cx="0" cy="0"/>
-          <a:chOff x="0" y="0"/>
-          <a:chExt cx="0" cy="0"/>
-        </a:xfrm>
-      </p:grpSpPr>
-      <p:sp>
-        <p:nvSpPr>
-          <p:cNvPr id="4" name="Title 3">
-            <a:extLst>
-              <a:ext uri="{FF2B5EF4-FFF2-40B4-BE49-F238E27FC236}">
-                <a16:creationId xmlns:a16="http://schemas.microsoft.com/office/drawing/2014/main" id="{315E3981-F0D7-482C-A8E0-6A57700BECA7}"/>
-              </a:ext>
-            </a:extLst>
-          </p:cNvPr>
-          <p:cNvSpPr>
-            <a:spLocks noGrp="1"/>
-          </p:cNvSpPr>
-          <p:nvPr>
-            <p:ph type="title"/>
-          </p:nvPr>
-        </p:nvSpPr>
-        <p:spPr/>
-        <p:txBody>
-          <a:bodyPr/>
-          <a:lstStyle/>
-          <a:p>
-            <a:r>
-              <a:rPr lang="en-US" dirty="0"/>
-              <a:t>Content Title 04</a:t>
-            </a:r>
-          </a:p>
-        </p:txBody>
-      </p:sp>
-      <p:pic>
-        <p:nvPicPr>
-          <p:cNvPr id="8" name="Picture Placeholder 7" descr="Triangular pattern design with dimension">
-            <a:extLst>
-              <a:ext uri="{FF2B5EF4-FFF2-40B4-BE49-F238E27FC236}">
-                <a16:creationId xmlns:a16="http://schemas.microsoft.com/office/drawing/2014/main" id="{2301248D-7370-7643-9BE6-F8CDCFF4D460}"/>
-              </a:ext>
-            </a:extLst>
-          </p:cNvPr>
-          <p:cNvPicPr>
-            <a:picLocks noGrp="1" noChangeAspect="1"/>
-          </p:cNvPicPr>
-          <p:nvPr>
-            <p:ph type="pic" sz="quarter" idx="19"/>
-          </p:nvPr>
-        </p:nvPicPr>
-        <p:blipFill rotWithShape="1">
-          <a:blip r:embed="rId2">
-            <a:extLst>
-              <a:ext uri="{28A0092B-C50C-407E-A947-70E740481C1C}">
-                <a14:useLocalDpi xmlns:a14="http://schemas.microsoft.com/office/drawing/2010/main" val="0"/>
-              </a:ext>
-            </a:extLst>
-          </a:blip>
-          <a:srcRect/>
-          <a:stretch/>
-        </p:blipFill>
-        <p:spPr>
-          <a:xfrm>
-            <a:off x="-2" y="1352575"/>
-            <a:ext cx="12192002" cy="2289897"/>
-          </a:xfrm>
-        </p:spPr>
-      </p:pic>
-      <p:sp>
-        <p:nvSpPr>
-          <p:cNvPr id="19" name="Text Placeholder 18">
-            <a:extLst>
-              <a:ext uri="{FF2B5EF4-FFF2-40B4-BE49-F238E27FC236}">
-                <a16:creationId xmlns:a16="http://schemas.microsoft.com/office/drawing/2014/main" id="{782206B1-586F-4254-9B36-D06C4E294ACF}"/>
-              </a:ext>
-            </a:extLst>
-          </p:cNvPr>
-          <p:cNvSpPr>
-            <a:spLocks noGrp="1"/>
-          </p:cNvSpPr>
-          <p:nvPr>
-            <p:ph type="body" sz="quarter" idx="18"/>
-          </p:nvPr>
-        </p:nvSpPr>
-        <p:spPr/>
-        <p:txBody>
-          <a:bodyPr/>
-          <a:lstStyle/>
-          <a:p>
-            <a:r>
-              <a:rPr lang="en-US" dirty="0"/>
-              <a:t>Lorem ipsum dolor sit amet, consectetuer adipiscing elit. Maecenas porttitor congue massa. Fusce posuere, magna sed pulvinar ultricies, purus lectus malesuada libero, sit amet commodo magna eros quis urna. Nunc viverra imperdiet enim. Fusce est. Vivamus a tellus.</a:t>
-            </a:r>
-          </a:p>
-          <a:p>
-            <a:r>
-              <a:rPr lang="en-US" dirty="0"/>
-              <a:t>Pellentesque habitant morbi tristique senectus et netus et malesuada fames ac turpis egestas. Proin pharetra nonummy pede. Mauris et orci.</a:t>
-            </a:r>
-          </a:p>
-        </p:txBody>
-      </p:sp>
-      <p:sp>
-        <p:nvSpPr>
-          <p:cNvPr id="2" name="Slide Number Placeholder 1">
-            <a:extLst>
-              <a:ext uri="{FF2B5EF4-FFF2-40B4-BE49-F238E27FC236}">
-                <a16:creationId xmlns:a16="http://schemas.microsoft.com/office/drawing/2014/main" id="{FAC2D367-2A6E-41FE-A9EA-24FF17BCAA97}"/>
-              </a:ext>
-            </a:extLst>
-          </p:cNvPr>
-          <p:cNvSpPr>
-            <a:spLocks noGrp="1"/>
-          </p:cNvSpPr>
-          <p:nvPr>
-            <p:ph type="sldNum" sz="quarter" idx="12"/>
-          </p:nvPr>
-        </p:nvSpPr>
-        <p:spPr/>
-        <p:txBody>
-          <a:bodyPr/>
-          <a:lstStyle/>
-          <a:p>
-            <a:fld id="{C263D6C4-4840-40CC-AC84-17E24B3B7BDE}" type="slidenum">
-              <a:rPr lang="en-US" smtClean="0"/>
-              <a:pPr/>
-              <a:t>9</a:t>
-            </a:fld>
-            <a:endParaRPr lang="en-US" dirty="0"/>
-          </a:p>
-        </p:txBody>
-      </p:sp>
-    </p:spTree>
-    <p:extLst>
-      <p:ext uri="{BB962C8B-B14F-4D97-AF65-F5344CB8AC3E}">
-        <p14:creationId xmlns:p14="http://schemas.microsoft.com/office/powerpoint/2010/main" val="663103393"/>
       </p:ext>
     </p:extLst>
   </p:cSld>
@@ -31335,20 +31597,20 @@
 </file>
 
 <file path=customXml/item1.xml><?xml version="1.0" encoding="utf-8"?>
-<p:properties xmlns:p="http://schemas.microsoft.com/office/2006/metadata/properties" xmlns:xsi="http://www.w3.org/2001/XMLSchema-instance" xmlns:pc="http://schemas.microsoft.com/office/infopath/2007/PartnerControls">
-  <documentManagement>
-    <MediaServiceKeyPoints xmlns="71af3243-3dd4-4a8d-8c0d-dd76da1f02a5" xsi:nil="true"/>
-  </documentManagement>
-</p:properties>
-</file>
-
-<file path=customXml/item2.xml><?xml version="1.0" encoding="utf-8"?>
 <?mso-contentType ?>
 <FormTemplates xmlns="http://schemas.microsoft.com/sharepoint/v3/contenttype/forms">
   <Display>DocumentLibraryForm</Display>
   <Edit>DocumentLibraryForm</Edit>
   <New>DocumentLibraryForm</New>
 </FormTemplates>
+</file>
+
+<file path=customXml/item2.xml><?xml version="1.0" encoding="utf-8"?>
+<p:properties xmlns:p="http://schemas.microsoft.com/office/2006/metadata/properties" xmlns:xsi="http://www.w3.org/2001/XMLSchema-instance" xmlns:pc="http://schemas.microsoft.com/office/infopath/2007/PartnerControls">
+  <documentManagement>
+    <MediaServiceKeyPoints xmlns="71af3243-3dd4-4a8d-8c0d-dd76da1f02a5" xsi:nil="true"/>
+  </documentManagement>
+</p:properties>
 </file>
 
 <file path=customXml/item3.xml><?xml version="1.0" encoding="utf-8"?>
@@ -31563,19 +31825,19 @@
 </file>
 
 <file path=customXml/itemProps1.xml><?xml version="1.0" encoding="utf-8"?>
+<ds:datastoreItem xmlns:ds="http://schemas.openxmlformats.org/officeDocument/2006/customXml" ds:itemID="{5B26E0C9-B2AA-42E6-97B6-E1B7D9EAF129}">
+  <ds:schemaRefs>
+    <ds:schemaRef ds:uri="http://schemas.microsoft.com/sharepoint/v3/contenttype/forms"/>
+  </ds:schemaRefs>
+</ds:datastoreItem>
+</file>
+
+<file path=customXml/itemProps2.xml><?xml version="1.0" encoding="utf-8"?>
 <ds:datastoreItem xmlns:ds="http://schemas.openxmlformats.org/officeDocument/2006/customXml" ds:itemID="{F5757914-1161-4661-9696-421FD6935CDD}">
   <ds:schemaRefs>
     <ds:schemaRef ds:uri="http://schemas.microsoft.com/office/2006/metadata/properties"/>
     <ds:schemaRef ds:uri="http://schemas.microsoft.com/office/infopath/2007/PartnerControls"/>
     <ds:schemaRef ds:uri="71af3243-3dd4-4a8d-8c0d-dd76da1f02a5"/>
-  </ds:schemaRefs>
-</ds:datastoreItem>
-</file>
-
-<file path=customXml/itemProps2.xml><?xml version="1.0" encoding="utf-8"?>
-<ds:datastoreItem xmlns:ds="http://schemas.openxmlformats.org/officeDocument/2006/customXml" ds:itemID="{5B26E0C9-B2AA-42E6-97B6-E1B7D9EAF129}">
-  <ds:schemaRefs>
-    <ds:schemaRef ds:uri="http://schemas.microsoft.com/sharepoint/v3/contenttype/forms"/>
   </ds:schemaRefs>
 </ds:datastoreItem>
 </file>

</xml_diff>